<commit_message>
Revised after EDA session with Dr. Ozturk
</commit_message>
<xml_diff>
--- a/Presentation.pptx
+++ b/Presentation.pptx
@@ -230,7 +230,7 @@
           <a:p>
             <a:fld id="{C1F2FD16-491B-4854-B442-B1808B824DF0}" type="datetimeFigureOut">
               <a:rPr lang="en-US" smtClean="0"/>
-              <a:t>12/30/2019</a:t>
+              <a:t>1/2/2020</a:t>
             </a:fld>
             <a:endParaRPr lang="en-US"/>
           </a:p>
@@ -1924,7 +1924,7 @@
                 <a:ea typeface="+mn-ea"/>
                 <a:cs typeface="+mn-cs"/>
               </a:rPr>
-              <a:t>This chart is breweries in each state divided by the population in each state.</a:t>
+              <a:t>This chart is population in each state divided by the number of breweries in each state.</a:t>
             </a:r>
           </a:p>
           <a:p>
@@ -1942,7 +1942,7 @@
                 <a:ea typeface="+mn-ea"/>
                 <a:cs typeface="+mn-cs"/>
               </a:rPr>
-              <a:t>Red areas are oversaturated (too many breweries per capita). Notice how over-saturated the Northwest and Mountain states are.</a:t>
+              <a:t>Red areas are oversaturated (too many breweries for the population in that state). Notice how over-saturated the Northwest and Mountain states are.</a:t>
             </a:r>
           </a:p>
           <a:p>
@@ -2345,7 +2345,7 @@
             <a:fld id="{276D79ED-3FA7-4EF8-964B-EB8BCFAB02F8}" type="datetimeFigureOut">
               <a:rPr lang="en-US" smtClean="0"/>
               <a:pPr/>
-              <a:t>12/26/2019</a:t>
+              <a:t>1/2/2020</a:t>
             </a:fld>
             <a:endParaRPr lang="en-US"/>
           </a:p>
@@ -2530,7 +2530,7 @@
           <a:p>
             <a:fld id="{276D79ED-3FA7-4EF8-964B-EB8BCFAB02F8}" type="datetimeFigureOut">
               <a:rPr lang="en-US" smtClean="0"/>
-              <a:t>12/26/2019</a:t>
+              <a:t>1/2/2020</a:t>
             </a:fld>
             <a:endParaRPr lang="en-US"/>
           </a:p>
@@ -2776,7 +2776,7 @@
           <a:p>
             <a:fld id="{276D79ED-3FA7-4EF8-964B-EB8BCFAB02F8}" type="datetimeFigureOut">
               <a:rPr lang="en-US" smtClean="0"/>
-              <a:t>12/26/2019</a:t>
+              <a:t>1/2/2020</a:t>
             </a:fld>
             <a:endParaRPr lang="en-US"/>
           </a:p>
@@ -3007,7 +3007,7 @@
           <a:p>
             <a:fld id="{276D79ED-3FA7-4EF8-964B-EB8BCFAB02F8}" type="datetimeFigureOut">
               <a:rPr lang="en-US" smtClean="0"/>
-              <a:t>12/26/2019</a:t>
+              <a:t>1/2/2020</a:t>
             </a:fld>
             <a:endParaRPr lang="en-US"/>
           </a:p>
@@ -3371,7 +3371,7 @@
           <a:p>
             <a:fld id="{276D79ED-3FA7-4EF8-964B-EB8BCFAB02F8}" type="datetimeFigureOut">
               <a:rPr lang="en-US" smtClean="0"/>
-              <a:t>12/26/2019</a:t>
+              <a:t>1/2/2020</a:t>
             </a:fld>
             <a:endParaRPr lang="en-US"/>
           </a:p>
@@ -3488,7 +3488,7 @@
           <a:p>
             <a:fld id="{276D79ED-3FA7-4EF8-964B-EB8BCFAB02F8}" type="datetimeFigureOut">
               <a:rPr lang="en-US" smtClean="0"/>
-              <a:t>12/26/2019</a:t>
+              <a:t>1/2/2020</a:t>
             </a:fld>
             <a:endParaRPr lang="en-US"/>
           </a:p>
@@ -3583,7 +3583,7 @@
           <a:p>
             <a:fld id="{276D79ED-3FA7-4EF8-964B-EB8BCFAB02F8}" type="datetimeFigureOut">
               <a:rPr lang="en-US" smtClean="0"/>
-              <a:t>12/26/2019</a:t>
+              <a:t>1/2/2020</a:t>
             </a:fld>
             <a:endParaRPr lang="en-US"/>
           </a:p>
@@ -3859,7 +3859,7 @@
           <a:p>
             <a:fld id="{276D79ED-3FA7-4EF8-964B-EB8BCFAB02F8}" type="datetimeFigureOut">
               <a:rPr lang="en-US" smtClean="0"/>
-              <a:t>12/26/2019</a:t>
+              <a:t>1/2/2020</a:t>
             </a:fld>
             <a:endParaRPr lang="en-US"/>
           </a:p>
@@ -4115,7 +4115,7 @@
           <a:p>
             <a:fld id="{276D79ED-3FA7-4EF8-964B-EB8BCFAB02F8}" type="datetimeFigureOut">
               <a:rPr lang="en-US" smtClean="0"/>
-              <a:t>12/26/2019</a:t>
+              <a:t>1/2/2020</a:t>
             </a:fld>
             <a:endParaRPr lang="en-US"/>
           </a:p>
@@ -4335,7 +4335,7 @@
           <a:p>
             <a:fld id="{276D79ED-3FA7-4EF8-964B-EB8BCFAB02F8}" type="datetimeFigureOut">
               <a:rPr lang="en-US" smtClean="0"/>
-              <a:t>12/26/2019</a:t>
+              <a:t>1/2/2020</a:t>
             </a:fld>
             <a:endParaRPr lang="en-US"/>
           </a:p>
@@ -7842,54 +7842,12 @@
           <a:chExt cx="0" cy="0"/>
         </a:xfrm>
       </p:grpSpPr>
-      <p:sp>
-        <p:nvSpPr>
-          <p:cNvPr id="5" name="Title 1">
+      <p:pic>
+        <p:nvPicPr>
+          <p:cNvPr id="2" name="Picture 1">
             <a:extLst>
               <a:ext uri="{FF2B5EF4-FFF2-40B4-BE49-F238E27FC236}">
-                <a16:creationId xmlns:a16="http://schemas.microsoft.com/office/drawing/2014/main" id="{16D909AC-8228-47E8-A61E-02856FE7EEDB}"/>
-              </a:ext>
-            </a:extLst>
-          </p:cNvPr>
-          <p:cNvSpPr>
-            <a:spLocks noGrp="1"/>
-          </p:cNvSpPr>
-          <p:nvPr>
-            <p:ph type="title"/>
-          </p:nvPr>
-        </p:nvSpPr>
-        <p:spPr>
-          <a:xfrm>
-            <a:off x="404943" y="81817"/>
-            <a:ext cx="10047352" cy="1008752"/>
-          </a:xfrm>
-        </p:spPr>
-        <p:txBody>
-          <a:bodyPr>
-            <a:normAutofit fontScale="90000"/>
-          </a:bodyPr>
-          <a:lstStyle/>
-          <a:p>
-            <a:r>
-              <a:rPr lang="en-US" dirty="0"/>
-              <a:t>Brewery Analysis by State:</a:t>
-            </a:r>
-            <a:br>
-              <a:rPr lang="en-US" dirty="0"/>
-            </a:br>
-            <a:r>
-              <a:rPr lang="en-US" b="0" dirty="0"/>
-              <a:t>Per Capita as of 2015</a:t>
-            </a:r>
-          </a:p>
-        </p:txBody>
-      </p:sp>
-      <p:pic>
-        <p:nvPicPr>
-          <p:cNvPr id="6" name="Picture 5">
-            <a:extLst>
-              <a:ext uri="{FF2B5EF4-FFF2-40B4-BE49-F238E27FC236}">
-                <a16:creationId xmlns:a16="http://schemas.microsoft.com/office/drawing/2014/main" id="{B25CC151-BB3E-45E9-9DDE-8B23B46CD27A}"/>
+                <a16:creationId xmlns:a16="http://schemas.microsoft.com/office/drawing/2014/main" id="{C510F840-6730-4D85-BFA1-453BE06C48AA}"/>
               </a:ext>
             </a:extLst>
           </p:cNvPr>
@@ -7900,19 +7858,61 @@
         </p:nvPicPr>
         <p:blipFill rotWithShape="1">
           <a:blip r:embed="rId3"/>
-          <a:srcRect l="4221" t="14808" r="2436"/>
+          <a:srcRect r="17591"/>
           <a:stretch/>
         </p:blipFill>
         <p:spPr>
           <a:xfrm>
-            <a:off x="817185" y="586193"/>
-            <a:ext cx="10557630" cy="6293843"/>
+            <a:off x="0" y="751606"/>
+            <a:ext cx="10133555" cy="6106393"/>
           </a:xfrm>
           <a:prstGeom prst="rect">
             <a:avLst/>
           </a:prstGeom>
         </p:spPr>
       </p:pic>
+      <p:sp>
+        <p:nvSpPr>
+          <p:cNvPr id="5" name="Title 1">
+            <a:extLst>
+              <a:ext uri="{FF2B5EF4-FFF2-40B4-BE49-F238E27FC236}">
+                <a16:creationId xmlns:a16="http://schemas.microsoft.com/office/drawing/2014/main" id="{16D909AC-8228-47E8-A61E-02856FE7EEDB}"/>
+              </a:ext>
+            </a:extLst>
+          </p:cNvPr>
+          <p:cNvSpPr>
+            <a:spLocks noGrp="1"/>
+          </p:cNvSpPr>
+          <p:nvPr>
+            <p:ph type="title"/>
+          </p:nvPr>
+        </p:nvSpPr>
+        <p:spPr>
+          <a:xfrm>
+            <a:off x="404943" y="81817"/>
+            <a:ext cx="10047352" cy="1008752"/>
+          </a:xfrm>
+        </p:spPr>
+        <p:txBody>
+          <a:bodyPr>
+            <a:normAutofit fontScale="90000"/>
+          </a:bodyPr>
+          <a:lstStyle/>
+          <a:p>
+            <a:r>
+              <a:rPr lang="en-US" dirty="0"/>
+              <a:t>Brewery Analysis by State:</a:t>
+            </a:r>
+            <a:br>
+              <a:rPr lang="en-US" dirty="0"/>
+            </a:br>
+            <a:r>
+              <a:rPr lang="en-US" b="0" dirty="0"/>
+              <a:t>Population per Brewery as of 2015</a:t>
+            </a:r>
+          </a:p>
+        </p:txBody>
+      </p:sp>
       <p:pic>
         <p:nvPicPr>
           <p:cNvPr id="1026" name="Picture 2" descr="Related image">
@@ -7942,7 +7942,7 @@
         </p:blipFill>
         <p:spPr bwMode="auto">
           <a:xfrm>
-            <a:off x="6130619" y="3116378"/>
+            <a:off x="6311374" y="3188066"/>
             <a:ext cx="1233471" cy="1233471"/>
           </a:xfrm>
           <a:prstGeom prst="rect">
@@ -7989,7 +7989,7 @@
         </p:blipFill>
         <p:spPr bwMode="auto">
           <a:xfrm>
-            <a:off x="7895027" y="1786070"/>
+            <a:off x="8540144" y="2104996"/>
             <a:ext cx="1233471" cy="1233471"/>
           </a:xfrm>
           <a:prstGeom prst="rect">
@@ -8036,7 +8036,7 @@
         </p:blipFill>
         <p:spPr bwMode="auto">
           <a:xfrm>
-            <a:off x="6882181" y="2402806"/>
+            <a:off x="7395749" y="2450964"/>
             <a:ext cx="1233471" cy="1233471"/>
           </a:xfrm>
           <a:prstGeom prst="rect">
@@ -8083,7 +8083,7 @@
         </p:blipFill>
         <p:spPr bwMode="auto">
           <a:xfrm>
-            <a:off x="1428093" y="2402806"/>
+            <a:off x="839323" y="2499642"/>
             <a:ext cx="1233471" cy="1233471"/>
           </a:xfrm>
           <a:prstGeom prst="rect">
@@ -8099,6 +8099,36 @@
               </a14:hiddenFill>
             </a:ext>
           </a:extLst>
+        </p:spPr>
+      </p:pic>
+      <p:pic>
+        <p:nvPicPr>
+          <p:cNvPr id="3" name="Picture 2">
+            <a:extLst>
+              <a:ext uri="{FF2B5EF4-FFF2-40B4-BE49-F238E27FC236}">
+                <a16:creationId xmlns:a16="http://schemas.microsoft.com/office/drawing/2014/main" id="{22EE83F4-BAF9-4E24-AC40-770219390286}"/>
+              </a:ext>
+            </a:extLst>
+          </p:cNvPr>
+          <p:cNvPicPr>
+            <a:picLocks noChangeAspect="1"/>
+          </p:cNvPicPr>
+          <p:nvPr/>
+        </p:nvPicPr>
+        <p:blipFill>
+          <a:blip r:embed="rId5"/>
+          <a:stretch>
+            <a:fillRect/>
+          </a:stretch>
+        </p:blipFill>
+        <p:spPr>
+          <a:xfrm>
+            <a:off x="10210729" y="4741293"/>
+            <a:ext cx="1619476" cy="1714739"/>
+          </a:xfrm>
+          <a:prstGeom prst="rect">
+            <a:avLst/>
+          </a:prstGeom>
         </p:spPr>
       </p:pic>
     </p:spTree>

</xml_diff>